<commit_message>
can load menu again
</commit_message>
<xml_diff>
--- a/3d models/ppt/__Deflame.pptx
+++ b/3d models/ppt/__Deflame.pptx
@@ -197,7 +197,7 @@
           <a:p>
             <a:fld id="{E5742A41-E671-4430-BD11-9C70C9E0B339}" type="datetimeFigureOut">
               <a:rPr lang="en-CA" smtClean="0"/>
-              <a:t>2025-05-18</a:t>
+              <a:t>2025-05-24</a:t>
             </a:fld>
             <a:endParaRPr lang="en-CA"/>
           </a:p>
@@ -596,7 +596,7 @@
           <a:p>
             <a:fld id="{E174D934-5F45-4F20-9FDF-AE6396442B39}" type="datetimeFigureOut">
               <a:rPr lang="en-CA" smtClean="0"/>
-              <a:t>2025-05-18</a:t>
+              <a:t>2025-05-24</a:t>
             </a:fld>
             <a:endParaRPr lang="en-CA"/>
           </a:p>
@@ -766,7 +766,7 @@
           <a:p>
             <a:fld id="{E174D934-5F45-4F20-9FDF-AE6396442B39}" type="datetimeFigureOut">
               <a:rPr lang="en-CA" smtClean="0"/>
-              <a:t>2025-05-18</a:t>
+              <a:t>2025-05-24</a:t>
             </a:fld>
             <a:endParaRPr lang="en-CA"/>
           </a:p>
@@ -946,7 +946,7 @@
           <a:p>
             <a:fld id="{E174D934-5F45-4F20-9FDF-AE6396442B39}" type="datetimeFigureOut">
               <a:rPr lang="en-CA" smtClean="0"/>
-              <a:t>2025-05-18</a:t>
+              <a:t>2025-05-24</a:t>
             </a:fld>
             <a:endParaRPr lang="en-CA"/>
           </a:p>
@@ -1116,7 +1116,7 @@
           <a:p>
             <a:fld id="{E174D934-5F45-4F20-9FDF-AE6396442B39}" type="datetimeFigureOut">
               <a:rPr lang="en-CA" smtClean="0"/>
-              <a:t>2025-05-18</a:t>
+              <a:t>2025-05-24</a:t>
             </a:fld>
             <a:endParaRPr lang="en-CA"/>
           </a:p>
@@ -1362,7 +1362,7 @@
           <a:p>
             <a:fld id="{E174D934-5F45-4F20-9FDF-AE6396442B39}" type="datetimeFigureOut">
               <a:rPr lang="en-CA" smtClean="0"/>
-              <a:t>2025-05-18</a:t>
+              <a:t>2025-05-24</a:t>
             </a:fld>
             <a:endParaRPr lang="en-CA"/>
           </a:p>
@@ -1594,7 +1594,7 @@
           <a:p>
             <a:fld id="{E174D934-5F45-4F20-9FDF-AE6396442B39}" type="datetimeFigureOut">
               <a:rPr lang="en-CA" smtClean="0"/>
-              <a:t>2025-05-18</a:t>
+              <a:t>2025-05-24</a:t>
             </a:fld>
             <a:endParaRPr lang="en-CA"/>
           </a:p>
@@ -1961,7 +1961,7 @@
           <a:p>
             <a:fld id="{E174D934-5F45-4F20-9FDF-AE6396442B39}" type="datetimeFigureOut">
               <a:rPr lang="en-CA" smtClean="0"/>
-              <a:t>2025-05-18</a:t>
+              <a:t>2025-05-24</a:t>
             </a:fld>
             <a:endParaRPr lang="en-CA"/>
           </a:p>
@@ -2079,7 +2079,7 @@
           <a:p>
             <a:fld id="{E174D934-5F45-4F20-9FDF-AE6396442B39}" type="datetimeFigureOut">
               <a:rPr lang="en-CA" smtClean="0"/>
-              <a:t>2025-05-18</a:t>
+              <a:t>2025-05-24</a:t>
             </a:fld>
             <a:endParaRPr lang="en-CA"/>
           </a:p>
@@ -2174,7 +2174,7 @@
           <a:p>
             <a:fld id="{E174D934-5F45-4F20-9FDF-AE6396442B39}" type="datetimeFigureOut">
               <a:rPr lang="en-CA" smtClean="0"/>
-              <a:t>2025-05-18</a:t>
+              <a:t>2025-05-24</a:t>
             </a:fld>
             <a:endParaRPr lang="en-CA"/>
           </a:p>
@@ -2451,7 +2451,7 @@
           <a:p>
             <a:fld id="{E174D934-5F45-4F20-9FDF-AE6396442B39}" type="datetimeFigureOut">
               <a:rPr lang="en-CA" smtClean="0"/>
-              <a:t>2025-05-18</a:t>
+              <a:t>2025-05-24</a:t>
             </a:fld>
             <a:endParaRPr lang="en-CA"/>
           </a:p>
@@ -2708,7 +2708,7 @@
           <a:p>
             <a:fld id="{E174D934-5F45-4F20-9FDF-AE6396442B39}" type="datetimeFigureOut">
               <a:rPr lang="en-CA" smtClean="0"/>
-              <a:t>2025-05-18</a:t>
+              <a:t>2025-05-24</a:t>
             </a:fld>
             <a:endParaRPr lang="en-CA"/>
           </a:p>
@@ -2921,7 +2921,7 @@
           <a:p>
             <a:fld id="{E174D934-5F45-4F20-9FDF-AE6396442B39}" type="datetimeFigureOut">
               <a:rPr lang="en-CA" smtClean="0"/>
-              <a:t>2025-05-18</a:t>
+              <a:t>2025-05-24</a:t>
             </a:fld>
             <a:endParaRPr lang="en-CA"/>
           </a:p>
@@ -3379,7 +3379,7 @@
       </p:pic>
       <p:pic>
         <p:nvPicPr>
-          <p:cNvPr id="3" name="1">
+          <p:cNvPr id="3" name="p1">
             <a:extLst>
               <a:ext uri="{FF2B5EF4-FFF2-40B4-BE49-F238E27FC236}">
                 <a16:creationId xmlns:a16="http://schemas.microsoft.com/office/drawing/2014/main" id="{52503B82-46E8-0910-3954-24E6BEFA1A20}"/>

</xml_diff>